<commit_message>
updated ppt and pdf files
</commit_message>
<xml_diff>
--- a/LendingCaseStudy.pptx
+++ b/LendingCaseStudy.pptx
@@ -133,7 +133,7 @@
 <p1510:revInfo xmlns:a="http://schemas.openxmlformats.org/drawingml/2006/main" xmlns:r="http://schemas.openxmlformats.org/officeDocument/2006/relationships" xmlns:p1510="http://schemas.microsoft.com/office/powerpoint/2015/10/main">
   <p1510:revLst>
     <p1510:client id="{20A2C93B-275A-4BA0-AF7D-2103E7E4E854}" v="418" dt="2023-11-07T17:37:50.579"/>
-    <p1510:client id="{83A1B89A-4A21-48EF-9B12-85DDD6E10B62}" v="62" dt="2023-11-08T13:56:31.467"/>
+    <p1510:client id="{83A1B89A-4A21-48EF-9B12-85DDD6E10B62}" v="89" dt="2023-11-08T14:42:49.488"/>
     <p1510:client id="{9470F6DE-8325-40C1-9055-640B4262E833}" v="127" dt="2023-11-06T16:50:13.729"/>
     <p1510:client id="{B9F582D0-B29F-4457-9987-C57C67B183A6}" v="2" dt="2023-11-07T17:55:38.156"/>
     <p1510:client id="{D99E5A36-D4DF-43F2-8527-B3679C1D6214}" v="870" dt="2023-11-05T16:53:38.570"/>
@@ -6058,6 +6058,52 @@
           </a:p>
         </p:txBody>
       </p:sp>
+      <p:sp>
+        <p:nvSpPr>
+          <p:cNvPr id="3" name="TextBox 2">
+            <a:extLst>
+              <a:ext uri="{FF2B5EF4-FFF2-40B4-BE49-F238E27FC236}">
+                <a16:creationId xmlns:a16="http://schemas.microsoft.com/office/drawing/2014/main" id="{30B0DB74-0CD9-D765-0EF3-9E30BADCCC89}"/>
+              </a:ext>
+            </a:extLst>
+          </p:cNvPr>
+          <p:cNvSpPr txBox="1"/>
+          <p:nvPr/>
+        </p:nvSpPr>
+        <p:spPr>
+          <a:xfrm>
+            <a:off x="8109857" y="4227286"/>
+            <a:ext cx="2743199" cy="646331"/>
+          </a:xfrm>
+          <a:prstGeom prst="rect">
+            <a:avLst/>
+          </a:prstGeom>
+          <a:noFill/>
+        </p:spPr>
+        <p:txBody>
+          <a:bodyPr rot="0" spcFirstLastPara="0" vertOverflow="overflow" horzOverflow="overflow" vert="horz" wrap="square" lIns="91440" tIns="45720" rIns="91440" bIns="45720" numCol="1" spcCol="0" rtlCol="0" fromWordArt="0" anchor="t" anchorCtr="0" forceAA="0" compatLnSpc="1">
+            <a:prstTxWarp prst="textNoShape">
+              <a:avLst/>
+            </a:prstTxWarp>
+            <a:spAutoFit/>
+          </a:bodyPr>
+          <a:lstStyle/>
+          <a:p>
+            <a:r>
+              <a:rPr lang="en-US" dirty="0"/>
+              <a:t>Aswani Reddy &amp; </a:t>
+            </a:r>
+            <a:r>
+              <a:rPr lang="en-US" dirty="0">
+                <a:ea typeface="+mn-lt"/>
+                <a:cs typeface="+mn-lt"/>
+              </a:rPr>
+              <a:t>Kuldeep Mishra </a:t>
+            </a:r>
+            <a:endParaRPr lang="en-US" dirty="0"/>
+          </a:p>
+        </p:txBody>
+      </p:sp>
     </p:spTree>
     <p:extLst>
       <p:ext uri="{BB962C8B-B14F-4D97-AF65-F5344CB8AC3E}">

</xml_diff>